<commit_message>
Add part of lab06 & Fix fatal errors.
</commit_message>
<xml_diff>
--- a/lab05/Design.pptx
+++ b/lab05/Design.pptx
@@ -11644,8 +11644,8 @@
         </p:nvCxnSpPr>
         <p:spPr>
           <a:xfrm flipV="1">
-            <a:off x="8173720" y="544044"/>
-            <a:ext cx="0" cy="2591624"/>
+            <a:off x="8170286" y="546586"/>
+            <a:ext cx="3434" cy="2942212"/>
           </a:xfrm>
           <a:prstGeom prst="line">
             <a:avLst/>
@@ -12168,13 +12168,7 @@
               <a:rPr lang="en-US" altLang="zh-CN" sz="700" smtClean="0">
                 <a:latin typeface="Consolas" panose="020B0609020204030204" pitchFamily="49" charset="0"/>
               </a:rPr>
-              <a:t>I</a:t>
-            </a:r>
-            <a:r>
-              <a:rPr lang="en-US" altLang="zh-CN" sz="700" smtClean="0">
-                <a:latin typeface="Consolas" panose="020B0609020204030204" pitchFamily="49" charset="0"/>
-              </a:rPr>
-              <a:t>nst.</a:t>
+              <a:t>Inst.</a:t>
             </a:r>
             <a:endParaRPr lang="zh-CN" altLang="en-US" sz="700" dirty="0">
               <a:latin typeface="Consolas" panose="020B0609020204030204" pitchFamily="49" charset="0"/>
@@ -12219,6 +12213,198 @@
           <a:p>
             <a:pPr algn="ctr"/>
             <a:endParaRPr lang="zh-CN" altLang="en-US"/>
+          </a:p>
+        </p:txBody>
+      </p:sp>
+      <p:sp>
+        <p:nvSpPr>
+          <p:cNvPr id="259" name="椭圆 258"/>
+          <p:cNvSpPr/>
+          <p:nvPr/>
+        </p:nvSpPr>
+        <p:spPr>
+          <a:xfrm>
+            <a:off x="8147427" y="3114825"/>
+            <a:ext cx="45719" cy="45719"/>
+          </a:xfrm>
+          <a:prstGeom prst="ellipse">
+            <a:avLst/>
+          </a:prstGeom>
+        </p:spPr>
+        <p:style>
+          <a:lnRef idx="2">
+            <a:schemeClr val="dk1">
+              <a:shade val="50000"/>
+            </a:schemeClr>
+          </a:lnRef>
+          <a:fillRef idx="1">
+            <a:schemeClr val="dk1"/>
+          </a:fillRef>
+          <a:effectRef idx="0">
+            <a:schemeClr val="dk1"/>
+          </a:effectRef>
+          <a:fontRef idx="minor">
+            <a:schemeClr val="lt1"/>
+          </a:fontRef>
+        </p:style>
+        <p:txBody>
+          <a:bodyPr rtlCol="0" anchor="ctr"/>
+          <a:lstStyle/>
+          <a:p>
+            <a:pPr algn="ctr"/>
+            <a:endParaRPr lang="zh-CN" altLang="en-US"/>
+          </a:p>
+        </p:txBody>
+      </p:sp>
+      <p:cxnSp>
+        <p:nvCxnSpPr>
+          <p:cNvPr id="260" name="直接连接符 259"/>
+          <p:cNvCxnSpPr/>
+          <p:nvPr/>
+        </p:nvCxnSpPr>
+        <p:spPr>
+          <a:xfrm>
+            <a:off x="5484354" y="3491690"/>
+            <a:ext cx="2685932" cy="0"/>
+          </a:xfrm>
+          <a:prstGeom prst="line">
+            <a:avLst/>
+          </a:prstGeom>
+        </p:spPr>
+        <p:style>
+          <a:lnRef idx="1">
+            <a:schemeClr val="dk1"/>
+          </a:lnRef>
+          <a:fillRef idx="0">
+            <a:schemeClr val="dk1"/>
+          </a:fillRef>
+          <a:effectRef idx="0">
+            <a:schemeClr val="dk1"/>
+          </a:effectRef>
+          <a:fontRef idx="minor">
+            <a:schemeClr val="tx1"/>
+          </a:fontRef>
+        </p:style>
+      </p:cxnSp>
+      <p:sp>
+        <p:nvSpPr>
+          <p:cNvPr id="267" name="圆角矩形 266"/>
+          <p:cNvSpPr/>
+          <p:nvPr/>
+        </p:nvSpPr>
+        <p:spPr>
+          <a:xfrm>
+            <a:off x="6559201" y="3403481"/>
+            <a:ext cx="238496" cy="164876"/>
+          </a:xfrm>
+          <a:prstGeom prst="roundRect">
+            <a:avLst/>
+          </a:prstGeom>
+        </p:spPr>
+        <p:style>
+          <a:lnRef idx="0">
+            <a:schemeClr val="accent2"/>
+          </a:lnRef>
+          <a:fillRef idx="3">
+            <a:schemeClr val="accent2"/>
+          </a:fillRef>
+          <a:effectRef idx="3">
+            <a:schemeClr val="accent2"/>
+          </a:effectRef>
+          <a:fontRef idx="minor">
+            <a:schemeClr val="lt1"/>
+          </a:fontRef>
+        </p:style>
+        <p:txBody>
+          <a:bodyPr rtlCol="0" anchor="ctr"/>
+          <a:lstStyle/>
+          <a:p>
+            <a:pPr algn="ctr"/>
+            <a:r>
+              <a:rPr lang="en-US" altLang="zh-CN" sz="900" dirty="0">
+                <a:latin typeface="Consolas" panose="020B0609020204030204" pitchFamily="49" charset="0"/>
+              </a:rPr>
+              <a:t>~</a:t>
+            </a:r>
+            <a:endParaRPr lang="zh-CN" altLang="en-US" sz="900" dirty="0">
+              <a:latin typeface="Consolas" panose="020B0609020204030204" pitchFamily="49" charset="0"/>
+            </a:endParaRPr>
+          </a:p>
+        </p:txBody>
+      </p:sp>
+      <p:cxnSp>
+        <p:nvCxnSpPr>
+          <p:cNvPr id="268" name="直接连接符 267"/>
+          <p:cNvCxnSpPr/>
+          <p:nvPr/>
+        </p:nvCxnSpPr>
+        <p:spPr>
+          <a:xfrm flipV="1">
+            <a:off x="5484354" y="3489730"/>
+            <a:ext cx="1" cy="198000"/>
+          </a:xfrm>
+          <a:prstGeom prst="line">
+            <a:avLst/>
+          </a:prstGeom>
+        </p:spPr>
+        <p:style>
+          <a:lnRef idx="1">
+            <a:schemeClr val="dk1"/>
+          </a:lnRef>
+          <a:fillRef idx="0">
+            <a:schemeClr val="dk1"/>
+          </a:fillRef>
+          <a:effectRef idx="0">
+            <a:schemeClr val="dk1"/>
+          </a:effectRef>
+          <a:fontRef idx="minor">
+            <a:schemeClr val="tx1"/>
+          </a:fontRef>
+        </p:style>
+      </p:cxnSp>
+      <p:sp>
+        <p:nvSpPr>
+          <p:cNvPr id="266" name="圆角矩形 265"/>
+          <p:cNvSpPr/>
+          <p:nvPr/>
+        </p:nvSpPr>
+        <p:spPr>
+          <a:xfrm>
+            <a:off x="5300599" y="3586070"/>
+            <a:ext cx="257883" cy="164876"/>
+          </a:xfrm>
+          <a:prstGeom prst="roundRect">
+            <a:avLst/>
+          </a:prstGeom>
+        </p:spPr>
+        <p:style>
+          <a:lnRef idx="0">
+            <a:schemeClr val="accent2"/>
+          </a:lnRef>
+          <a:fillRef idx="3">
+            <a:schemeClr val="accent2"/>
+          </a:fillRef>
+          <a:effectRef idx="3">
+            <a:schemeClr val="accent2"/>
+          </a:effectRef>
+          <a:fontRef idx="minor">
+            <a:schemeClr val="lt1"/>
+          </a:fontRef>
+        </p:style>
+        <p:txBody>
+          <a:bodyPr rtlCol="0" anchor="ctr"/>
+          <a:lstStyle/>
+          <a:p>
+            <a:pPr algn="ctr"/>
+            <a:r>
+              <a:rPr lang="en-US" altLang="zh-CN" sz="900" dirty="0">
+                <a:latin typeface="Consolas" panose="020B0609020204030204" pitchFamily="49" charset="0"/>
+              </a:rPr>
+              <a:t>&amp;</a:t>
+            </a:r>
+            <a:endParaRPr lang="zh-CN" altLang="en-US" sz="900" dirty="0">
+              <a:latin typeface="Consolas" panose="020B0609020204030204" pitchFamily="49" charset="0"/>
+            </a:endParaRPr>
           </a:p>
         </p:txBody>
       </p:sp>

</xml_diff>